<commit_message>
Cleaning up the slides
Duplications in the slides, increasing the fonts for readability.
</commit_message>
<xml_diff>
--- a/02-bot_design/resources/activity/IntelligentAgent_02_BotDesign_Lab.pptx
+++ b/02-bot_design/resources/activity/IntelligentAgent_02_BotDesign_Lab.pptx
@@ -2431,7 +2431,7 @@
           <a:p>
             <a:fld id="{DDEAE8FA-D7B2-4534-825C-89895736491D}" type="datetimeFigureOut">
               <a:rPr lang="en-US" smtClean="0"/>
-              <a:t>4/24/2018</a:t>
+              <a:t>6/14/2018</a:t>
             </a:fld>
             <a:endParaRPr lang="en-US"/>
           </a:p>
@@ -3003,7 +3003,7 @@
           <a:p>
             <a:fld id="{174E4CE6-2FE4-433F-87B8-CB5DD266EBFC}" type="datetime8">
               <a:rPr lang="en-US" smtClean="0"/>
-              <a:t>4/24/2018 1:10 PM</a:t>
+              <a:t>6/14/2018 10:45 AM</a:t>
             </a:fld>
             <a:endParaRPr lang="en-US"/>
           </a:p>
@@ -3901,7 +3901,7 @@
                 <a:tabLst/>
                 <a:defRPr/>
               </a:pPr>
-              <a:t>4/24/2018 1:10 PM</a:t>
+              <a:t>6/14/2018 10:45 AM</a:t>
             </a:fld>
             <a:endParaRPr kumimoji="0" lang="en-US" sz="1200" b="0" i="0" u="none" strike="noStrike" kern="1200" cap="none" spc="0" normalizeH="0" baseline="0" noProof="0">
               <a:ln>
@@ -26155,7 +26155,7 @@
           <a:p>
             <a:fld id="{8E1C3551-4691-492D-A7B3-905DCA39CACC}" type="datetimeFigureOut">
               <a:rPr lang="en-US" smtClean="0"/>
-              <a:t>4/24/2018</a:t>
+              <a:t>6/14/2018</a:t>
             </a:fld>
             <a:endParaRPr lang="en-US"/>
           </a:p>
@@ -26323,7 +26323,7 @@
           <a:p>
             <a:fld id="{8E1C3551-4691-492D-A7B3-905DCA39CACC}" type="datetimeFigureOut">
               <a:rPr lang="en-US" smtClean="0"/>
-              <a:t>4/24/2018</a:t>
+              <a:t>6/14/2018</a:t>
             </a:fld>
             <a:endParaRPr lang="en-US"/>
           </a:p>
@@ -26568,7 +26568,7 @@
           <a:p>
             <a:fld id="{8E1C3551-4691-492D-A7B3-905DCA39CACC}" type="datetimeFigureOut">
               <a:rPr lang="en-US" smtClean="0"/>
-              <a:t>4/24/2018</a:t>
+              <a:t>6/14/2018</a:t>
             </a:fld>
             <a:endParaRPr lang="en-US"/>
           </a:p>
@@ -26797,7 +26797,7 @@
           <a:p>
             <a:fld id="{8E1C3551-4691-492D-A7B3-905DCA39CACC}" type="datetimeFigureOut">
               <a:rPr lang="en-US" smtClean="0"/>
-              <a:t>4/24/2018</a:t>
+              <a:t>6/14/2018</a:t>
             </a:fld>
             <a:endParaRPr lang="en-US"/>
           </a:p>
@@ -27161,7 +27161,7 @@
           <a:p>
             <a:fld id="{8E1C3551-4691-492D-A7B3-905DCA39CACC}" type="datetimeFigureOut">
               <a:rPr lang="en-US" smtClean="0"/>
-              <a:t>4/24/2018</a:t>
+              <a:t>6/14/2018</a:t>
             </a:fld>
             <a:endParaRPr lang="en-US"/>
           </a:p>
@@ -27501,7 +27501,7 @@
           <a:p>
             <a:fld id="{8E1C3551-4691-492D-A7B3-905DCA39CACC}" type="datetimeFigureOut">
               <a:rPr lang="en-US" smtClean="0"/>
-              <a:t>4/24/2018</a:t>
+              <a:t>6/14/2018</a:t>
             </a:fld>
             <a:endParaRPr lang="en-US"/>
           </a:p>
@@ -27596,7 +27596,7 @@
           <a:p>
             <a:fld id="{8E1C3551-4691-492D-A7B3-905DCA39CACC}" type="datetimeFigureOut">
               <a:rPr lang="en-US" smtClean="0"/>
-              <a:t>4/24/2018</a:t>
+              <a:t>6/14/2018</a:t>
             </a:fld>
             <a:endParaRPr lang="en-US"/>
           </a:p>
@@ -27871,7 +27871,7 @@
           <a:p>
             <a:fld id="{8E1C3551-4691-492D-A7B3-905DCA39CACC}" type="datetimeFigureOut">
               <a:rPr lang="en-US" smtClean="0"/>
-              <a:t>4/24/2018</a:t>
+              <a:t>6/14/2018</a:t>
             </a:fld>
             <a:endParaRPr lang="en-US"/>
           </a:p>
@@ -28123,7 +28123,7 @@
           <a:p>
             <a:fld id="{8E1C3551-4691-492D-A7B3-905DCA39CACC}" type="datetimeFigureOut">
               <a:rPr lang="en-US" smtClean="0"/>
-              <a:t>4/24/2018</a:t>
+              <a:t>6/14/2018</a:t>
             </a:fld>
             <a:endParaRPr lang="en-US"/>
           </a:p>
@@ -28291,7 +28291,7 @@
           <a:p>
             <a:fld id="{8E1C3551-4691-492D-A7B3-905DCA39CACC}" type="datetimeFigureOut">
               <a:rPr lang="en-US" smtClean="0"/>
-              <a:t>4/24/2018</a:t>
+              <a:t>6/14/2018</a:t>
             </a:fld>
             <a:endParaRPr lang="en-US"/>
           </a:p>
@@ -28469,7 +28469,7 @@
           <a:p>
             <a:fld id="{8E1C3551-4691-492D-A7B3-905DCA39CACC}" type="datetimeFigureOut">
               <a:rPr lang="en-US" smtClean="0"/>
-              <a:t>4/24/2018</a:t>
+              <a:t>6/14/2018</a:t>
             </a:fld>
             <a:endParaRPr lang="en-US"/>
           </a:p>
@@ -32885,7 +32885,7 @@
           <a:p>
             <a:fld id="{40DB40CD-1F4C-4AE8-81E2-E5C7743C6DB9}" type="datetimeFigureOut">
               <a:rPr lang="en-GB" smtClean="0"/>
-              <a:t>24/04/2018</a:t>
+              <a:t>14/06/2018</a:t>
             </a:fld>
             <a:endParaRPr lang="en-GB"/>
           </a:p>
@@ -35437,7 +35437,7 @@
           <a:p>
             <a:fld id="{8E1C3551-4691-492D-A7B3-905DCA39CACC}" type="datetimeFigureOut">
               <a:rPr lang="en-US" smtClean="0"/>
-              <a:t>4/24/2018</a:t>
+              <a:t>6/14/2018</a:t>
             </a:fld>
             <a:endParaRPr lang="en-US"/>
           </a:p>
@@ -41893,7 +41893,7 @@
               <a:defRPr/>
             </a:pPr>
             <a:r>
-              <a:rPr lang="en-US" sz="1200">
+              <a:rPr lang="en-US" sz="1600" dirty="0">
                 <a:solidFill>
                   <a:prstClr val="black"/>
                 </a:solidFill>
@@ -43088,7 +43088,7 @@
               <a:defRPr/>
             </a:pPr>
             <a:r>
-              <a:rPr kumimoji="0" lang="en-US" sz="1200" b="0" i="0" u="none" strike="noStrike" kern="1200" cap="none" spc="0" normalizeH="0" baseline="0" noProof="0">
+              <a:rPr kumimoji="0" lang="en-US" sz="1600" b="0" i="0" u="none" strike="noStrike" kern="1200" cap="none" spc="0" normalizeH="0" baseline="0" noProof="0" dirty="0">
                 <a:ln>
                   <a:noFill/>
                 </a:ln>
@@ -43105,7 +43105,7 @@
               <a:t>The following illustrates use cases selected for the Project (</a:t>
             </a:r>
             <a:r>
-              <a:rPr kumimoji="0" lang="en-US" sz="1200" b="1" i="0" u="none" strike="noStrike" kern="1200" cap="none" spc="0" normalizeH="0" baseline="0" noProof="0">
+              <a:rPr kumimoji="0" lang="en-US" sz="1600" b="1" i="0" u="none" strike="noStrike" kern="1200" cap="none" spc="0" normalizeH="0" baseline="0" noProof="0" dirty="0">
                 <a:ln>
                   <a:noFill/>
                 </a:ln>
@@ -43122,7 +43122,7 @@
               <a:t>highlighted</a:t>
             </a:r>
             <a:r>
-              <a:rPr kumimoji="0" lang="en-US" sz="1200" b="0" i="0" u="none" strike="noStrike" kern="1200" cap="none" spc="0" normalizeH="0" baseline="0" noProof="0">
+              <a:rPr kumimoji="0" lang="en-US" sz="1600" b="0" i="0" u="none" strike="noStrike" kern="1200" cap="none" spc="0" normalizeH="0" baseline="0" noProof="0" dirty="0">
                 <a:ln>
                   <a:noFill/>
                 </a:ln>
@@ -45550,19 +45550,12 @@
 </file>
 
 <file path=customXml/item1.xml><?xml version="1.0" encoding="utf-8"?>
-<p:properties xmlns:p="http://schemas.microsoft.com/office/2006/metadata/properties" xmlns:xsi="http://www.w3.org/2001/XMLSchema-instance" xmlns:pc="http://schemas.microsoft.com/office/infopath/2007/PartnerControls">
-  <documentManagement>
-    <LastSharedByUser xmlns="8f159844-3118-4b08-9ac0-0a51e3431bb6">v-karfis@microsoft.com</LastSharedByUser>
-    <SharedWithUsers xmlns="8f159844-3118-4b08-9ac0-0a51e3431bb6">
-      <UserInfo>
-        <DisplayName>Natalie Nurock</DisplayName>
-        <AccountId>85</AccountId>
-        <AccountType/>
-      </UserInfo>
-    </SharedWithUsers>
-    <LastSharedByTime xmlns="8f159844-3118-4b08-9ac0-0a51e3431bb6">2018-03-14T05:42:29+00:00</LastSharedByTime>
-  </documentManagement>
-</p:properties>
+<?mso-contentType ?>
+<FormTemplates xmlns="http://schemas.microsoft.com/sharepoint/v3/contenttype/forms">
+  <Display>DocumentLibraryForm</Display>
+  <Edit>DocumentLibraryForm</Edit>
+  <New>DocumentLibraryForm</New>
+</FormTemplates>
 </file>
 
 <file path=customXml/item2.xml><?xml version="1.0" encoding="utf-8"?>
@@ -45743,27 +45736,25 @@
 </file>
 
 <file path=customXml/item3.xml><?xml version="1.0" encoding="utf-8"?>
-<?mso-contentType ?>
-<FormTemplates xmlns="http://schemas.microsoft.com/sharepoint/v3/contenttype/forms">
-  <Display>DocumentLibraryForm</Display>
-  <Edit>DocumentLibraryForm</Edit>
-  <New>DocumentLibraryForm</New>
-</FormTemplates>
+<p:properties xmlns:p="http://schemas.microsoft.com/office/2006/metadata/properties" xmlns:xsi="http://www.w3.org/2001/XMLSchema-instance" xmlns:pc="http://schemas.microsoft.com/office/infopath/2007/PartnerControls">
+  <documentManagement>
+    <LastSharedByUser xmlns="8f159844-3118-4b08-9ac0-0a51e3431bb6">v-karfis@microsoft.com</LastSharedByUser>
+    <SharedWithUsers xmlns="8f159844-3118-4b08-9ac0-0a51e3431bb6">
+      <UserInfo>
+        <DisplayName>Natalie Nurock</DisplayName>
+        <AccountId>85</AccountId>
+        <AccountType/>
+      </UserInfo>
+    </SharedWithUsers>
+    <LastSharedByTime xmlns="8f159844-3118-4b08-9ac0-0a51e3431bb6">2018-03-14T05:42:29+00:00</LastSharedByTime>
+  </documentManagement>
+</p:properties>
 </file>
 
 <file path=customXml/itemProps1.xml><?xml version="1.0" encoding="utf-8"?>
-<ds:datastoreItem xmlns:ds="http://schemas.openxmlformats.org/officeDocument/2006/customXml" ds:itemID="{1E91DBAA-73B1-46DE-A02B-B400BCCAEA24}">
+<ds:datastoreItem xmlns:ds="http://schemas.openxmlformats.org/officeDocument/2006/customXml" ds:itemID="{81018208-8004-4CED-BF44-ED368E32B811}">
   <ds:schemaRefs>
-    <ds:schemaRef ds:uri="http://purl.org/dc/terms/"/>
-    <ds:schemaRef ds:uri="http://schemas.microsoft.com/office/2006/documentManagement/types"/>
-    <ds:schemaRef ds:uri="http://purl.org/dc/elements/1.1/"/>
-    <ds:schemaRef ds:uri="http://schemas.microsoft.com/office/2006/metadata/properties"/>
-    <ds:schemaRef ds:uri="http://schemas.microsoft.com/office/infopath/2007/PartnerControls"/>
-    <ds:schemaRef ds:uri="http://purl.org/dc/dcmitype/"/>
-    <ds:schemaRef ds:uri="87bad0cd-9f5f-4471-94ca-f7c37ef15840"/>
-    <ds:schemaRef ds:uri="http://schemas.openxmlformats.org/package/2006/metadata/core-properties"/>
-    <ds:schemaRef ds:uri="8f159844-3118-4b08-9ac0-0a51e3431bb6"/>
-    <ds:schemaRef ds:uri="http://www.w3.org/XML/1998/namespace"/>
+    <ds:schemaRef ds:uri="http://schemas.microsoft.com/sharepoint/v3/contenttype/forms"/>
   </ds:schemaRefs>
 </ds:datastoreItem>
 </file>
@@ -45788,9 +45779,18 @@
 </file>
 
 <file path=customXml/itemProps3.xml><?xml version="1.0" encoding="utf-8"?>
-<ds:datastoreItem xmlns:ds="http://schemas.openxmlformats.org/officeDocument/2006/customXml" ds:itemID="{81018208-8004-4CED-BF44-ED368E32B811}">
+<ds:datastoreItem xmlns:ds="http://schemas.openxmlformats.org/officeDocument/2006/customXml" ds:itemID="{1E91DBAA-73B1-46DE-A02B-B400BCCAEA24}">
   <ds:schemaRefs>
-    <ds:schemaRef ds:uri="http://schemas.microsoft.com/sharepoint/v3/contenttype/forms"/>
+    <ds:schemaRef ds:uri="http://purl.org/dc/terms/"/>
+    <ds:schemaRef ds:uri="http://schemas.microsoft.com/office/2006/documentManagement/types"/>
+    <ds:schemaRef ds:uri="http://purl.org/dc/elements/1.1/"/>
+    <ds:schemaRef ds:uri="http://schemas.microsoft.com/office/2006/metadata/properties"/>
+    <ds:schemaRef ds:uri="http://schemas.microsoft.com/office/infopath/2007/PartnerControls"/>
+    <ds:schemaRef ds:uri="http://purl.org/dc/dcmitype/"/>
+    <ds:schemaRef ds:uri="87bad0cd-9f5f-4471-94ca-f7c37ef15840"/>
+    <ds:schemaRef ds:uri="http://schemas.openxmlformats.org/package/2006/metadata/core-properties"/>
+    <ds:schemaRef ds:uri="8f159844-3118-4b08-9ac0-0a51e3431bb6"/>
+    <ds:schemaRef ds:uri="http://www.w3.org/XML/1998/namespace"/>
   </ds:schemaRefs>
 </ds:datastoreItem>
 </file>
</xml_diff>

<commit_message>
Commit new push changes
</commit_message>
<xml_diff>
--- a/02-bot_design/resources/activity/IntelligentAgent_02_BotDesign_Lab.pptx
+++ b/02-bot_design/resources/activity/IntelligentAgent_02_BotDesign_Lab.pptx
@@ -9,7 +9,7 @@
     <p:sldMasterId id="2147483746" r:id="rId8"/>
   </p:sldMasterIdLst>
   <p:notesMasterIdLst>
-    <p:notesMasterId r:id="rId17"/>
+    <p:notesMasterId r:id="rId16"/>
   </p:notesMasterIdLst>
   <p:sldIdLst>
     <p:sldId id="290" r:id="rId9"/>
@@ -17,9 +17,8 @@
     <p:sldId id="279" r:id="rId11"/>
     <p:sldId id="1593" r:id="rId12"/>
     <p:sldId id="1560" r:id="rId13"/>
-    <p:sldId id="1599" r:id="rId14"/>
-    <p:sldId id="1600" r:id="rId15"/>
-    <p:sldId id="1564" r:id="rId16"/>
+    <p:sldId id="1600" r:id="rId14"/>
+    <p:sldId id="1564" r:id="rId15"/>
   </p:sldIdLst>
   <p:sldSz cx="12192000" cy="6858000"/>
   <p:notesSz cx="6858000" cy="9144000"/>
@@ -2431,7 +2430,7 @@
           <a:p>
             <a:fld id="{DDEAE8FA-D7B2-4534-825C-89895736491D}" type="datetimeFigureOut">
               <a:rPr lang="en-US" smtClean="0"/>
-              <a:t>4/24/2018</a:t>
+              <a:t>6/27/2018</a:t>
             </a:fld>
             <a:endParaRPr lang="en-US"/>
           </a:p>
@@ -3003,7 +3002,7 @@
           <a:p>
             <a:fld id="{174E4CE6-2FE4-433F-87B8-CB5DD266EBFC}" type="datetime8">
               <a:rPr lang="en-US" smtClean="0"/>
-              <a:t>4/24/2018 1:10 PM</a:t>
+              <a:t>6/27/2018 6:05 PM</a:t>
             </a:fld>
             <a:endParaRPr lang="en-US"/>
           </a:p>
@@ -3526,7 +3525,7 @@
     </p:spTree>
     <p:extLst>
       <p:ext uri="{BB962C8B-B14F-4D97-AF65-F5344CB8AC3E}">
-        <p14:creationId xmlns:p14="http://schemas.microsoft.com/office/powerpoint/2010/main" val="630868460"/>
+        <p14:creationId xmlns:p14="http://schemas.microsoft.com/office/powerpoint/2010/main" val="3159525006"/>
       </p:ext>
     </p:extLst>
   </p:cSld>
@@ -3580,150 +3579,6 @@
           <a:bodyPr/>
           <a:lstStyle/>
           <a:p>
-            <a:endParaRPr lang="en-GB" dirty="0"/>
-          </a:p>
-        </p:txBody>
-      </p:sp>
-      <p:sp>
-        <p:nvSpPr>
-          <p:cNvPr id="4" name="Slide Number Placeholder 3"/>
-          <p:cNvSpPr>
-            <a:spLocks noGrp="1"/>
-          </p:cNvSpPr>
-          <p:nvPr>
-            <p:ph type="sldNum" sz="quarter" idx="10"/>
-          </p:nvPr>
-        </p:nvSpPr>
-        <p:spPr/>
-        <p:txBody>
-          <a:bodyPr/>
-          <a:lstStyle/>
-          <a:p>
-            <a:pPr marL="0" marR="0" lvl="0" indent="0" algn="r" defTabSz="914400" rtl="0" eaLnBrk="1" fontAlgn="auto" latinLnBrk="0" hangingPunct="1">
-              <a:lnSpc>
-                <a:spcPct val="100000"/>
-              </a:lnSpc>
-              <a:spcBef>
-                <a:spcPts val="0"/>
-              </a:spcBef>
-              <a:spcAft>
-                <a:spcPts val="0"/>
-              </a:spcAft>
-              <a:buClrTx/>
-              <a:buSzTx/>
-              <a:buFontTx/>
-              <a:buNone/>
-              <a:tabLst/>
-              <a:defRPr/>
-            </a:pPr>
-            <a:fld id="{56ADAA47-4E1C-49C7-AF85-DF9C4A6BF20A}" type="slidenum">
-              <a:rPr kumimoji="0" lang="en-US" sz="1200" b="0" i="0" u="none" strike="noStrike" kern="1200" cap="none" spc="0" normalizeH="0" baseline="0" noProof="0" smtClean="0">
-                <a:ln>
-                  <a:noFill/>
-                </a:ln>
-                <a:solidFill>
-                  <a:prstClr val="black"/>
-                </a:solidFill>
-                <a:effectLst/>
-                <a:uLnTx/>
-                <a:uFillTx/>
-                <a:latin typeface="Calibri" panose="020F0502020204030204"/>
-                <a:ea typeface="+mn-ea"/>
-                <a:cs typeface="+mn-cs"/>
-              </a:rPr>
-              <a:pPr marL="0" marR="0" lvl="0" indent="0" algn="r" defTabSz="914400" rtl="0" eaLnBrk="1" fontAlgn="auto" latinLnBrk="0" hangingPunct="1">
-                <a:lnSpc>
-                  <a:spcPct val="100000"/>
-                </a:lnSpc>
-                <a:spcBef>
-                  <a:spcPts val="0"/>
-                </a:spcBef>
-                <a:spcAft>
-                  <a:spcPts val="0"/>
-                </a:spcAft>
-                <a:buClrTx/>
-                <a:buSzTx/>
-                <a:buFontTx/>
-                <a:buNone/>
-                <a:tabLst/>
-                <a:defRPr/>
-              </a:pPr>
-              <a:t>7</a:t>
-            </a:fld>
-            <a:endParaRPr kumimoji="0" lang="en-US" sz="1200" b="0" i="0" u="none" strike="noStrike" kern="1200" cap="none" spc="0" normalizeH="0" baseline="0" noProof="0">
-              <a:ln>
-                <a:noFill/>
-              </a:ln>
-              <a:solidFill>
-                <a:prstClr val="black"/>
-              </a:solidFill>
-              <a:effectLst/>
-              <a:uLnTx/>
-              <a:uFillTx/>
-              <a:latin typeface="Calibri" panose="020F0502020204030204"/>
-              <a:ea typeface="+mn-ea"/>
-              <a:cs typeface="+mn-cs"/>
-            </a:endParaRPr>
-          </a:p>
-        </p:txBody>
-      </p:sp>
-    </p:spTree>
-    <p:extLst>
-      <p:ext uri="{BB962C8B-B14F-4D97-AF65-F5344CB8AC3E}">
-        <p14:creationId xmlns:p14="http://schemas.microsoft.com/office/powerpoint/2010/main" val="3159525006"/>
-      </p:ext>
-    </p:extLst>
-  </p:cSld>
-  <p:clrMapOvr>
-    <a:masterClrMapping/>
-  </p:clrMapOvr>
-</p:notes>
-</file>
-
-<file path=ppt/notesSlides/notesSlide8.xml><?xml version="1.0" encoding="utf-8"?>
-<p:notes xmlns:a="http://schemas.openxmlformats.org/drawingml/2006/main" xmlns:r="http://schemas.openxmlformats.org/officeDocument/2006/relationships" xmlns:p="http://schemas.openxmlformats.org/presentationml/2006/main">
-  <p:cSld>
-    <p:spTree>
-      <p:nvGrpSpPr>
-        <p:cNvPr id="1" name=""/>
-        <p:cNvGrpSpPr/>
-        <p:nvPr/>
-      </p:nvGrpSpPr>
-      <p:grpSpPr>
-        <a:xfrm>
-          <a:off x="0" y="0"/>
-          <a:ext cx="0" cy="0"/>
-          <a:chOff x="0" y="0"/>
-          <a:chExt cx="0" cy="0"/>
-        </a:xfrm>
-      </p:grpSpPr>
-      <p:sp>
-        <p:nvSpPr>
-          <p:cNvPr id="2" name="Slide Image Placeholder 1"/>
-          <p:cNvSpPr>
-            <a:spLocks noGrp="1" noRot="1" noChangeAspect="1"/>
-          </p:cNvSpPr>
-          <p:nvPr>
-            <p:ph type="sldImg"/>
-          </p:nvPr>
-        </p:nvSpPr>
-        <p:spPr/>
-      </p:sp>
-      <p:sp>
-        <p:nvSpPr>
-          <p:cNvPr id="3" name="Notes Placeholder 2"/>
-          <p:cNvSpPr>
-            <a:spLocks noGrp="1"/>
-          </p:cNvSpPr>
-          <p:nvPr>
-            <p:ph type="body" idx="1"/>
-          </p:nvPr>
-        </p:nvSpPr>
-        <p:spPr/>
-        <p:txBody>
-          <a:bodyPr/>
-          <a:lstStyle/>
-          <a:p>
             <a:endParaRPr lang="en-US"/>
           </a:p>
         </p:txBody>
@@ -3901,7 +3756,7 @@
                 <a:tabLst/>
                 <a:defRPr/>
               </a:pPr>
-              <a:t>4/24/2018 1:10 PM</a:t>
+              <a:t>6/27/2018 6:05 PM</a:t>
             </a:fld>
             <a:endParaRPr kumimoji="0" lang="en-US" sz="1200" b="0" i="0" u="none" strike="noStrike" kern="1200" cap="none" spc="0" normalizeH="0" baseline="0" noProof="0">
               <a:ln>
@@ -3984,7 +3839,7 @@
                 <a:tabLst/>
                 <a:defRPr/>
               </a:pPr>
-              <a:t>8</a:t>
+              <a:t>7</a:t>
             </a:fld>
             <a:endParaRPr kumimoji="0" lang="en-US" sz="1200" b="0" i="0" u="none" strike="noStrike" kern="1200" cap="none" spc="0" normalizeH="0" baseline="0" noProof="0">
               <a:ln>
@@ -26155,7 +26010,7 @@
           <a:p>
             <a:fld id="{8E1C3551-4691-492D-A7B3-905DCA39CACC}" type="datetimeFigureOut">
               <a:rPr lang="en-US" smtClean="0"/>
-              <a:t>4/24/2018</a:t>
+              <a:t>6/27/2018</a:t>
             </a:fld>
             <a:endParaRPr lang="en-US"/>
           </a:p>
@@ -26323,7 +26178,7 @@
           <a:p>
             <a:fld id="{8E1C3551-4691-492D-A7B3-905DCA39CACC}" type="datetimeFigureOut">
               <a:rPr lang="en-US" smtClean="0"/>
-              <a:t>4/24/2018</a:t>
+              <a:t>6/27/2018</a:t>
             </a:fld>
             <a:endParaRPr lang="en-US"/>
           </a:p>
@@ -26568,7 +26423,7 @@
           <a:p>
             <a:fld id="{8E1C3551-4691-492D-A7B3-905DCA39CACC}" type="datetimeFigureOut">
               <a:rPr lang="en-US" smtClean="0"/>
-              <a:t>4/24/2018</a:t>
+              <a:t>6/27/2018</a:t>
             </a:fld>
             <a:endParaRPr lang="en-US"/>
           </a:p>
@@ -26797,7 +26652,7 @@
           <a:p>
             <a:fld id="{8E1C3551-4691-492D-A7B3-905DCA39CACC}" type="datetimeFigureOut">
               <a:rPr lang="en-US" smtClean="0"/>
-              <a:t>4/24/2018</a:t>
+              <a:t>6/27/2018</a:t>
             </a:fld>
             <a:endParaRPr lang="en-US"/>
           </a:p>
@@ -27161,7 +27016,7 @@
           <a:p>
             <a:fld id="{8E1C3551-4691-492D-A7B3-905DCA39CACC}" type="datetimeFigureOut">
               <a:rPr lang="en-US" smtClean="0"/>
-              <a:t>4/24/2018</a:t>
+              <a:t>6/27/2018</a:t>
             </a:fld>
             <a:endParaRPr lang="en-US"/>
           </a:p>
@@ -27501,7 +27356,7 @@
           <a:p>
             <a:fld id="{8E1C3551-4691-492D-A7B3-905DCA39CACC}" type="datetimeFigureOut">
               <a:rPr lang="en-US" smtClean="0"/>
-              <a:t>4/24/2018</a:t>
+              <a:t>6/27/2018</a:t>
             </a:fld>
             <a:endParaRPr lang="en-US"/>
           </a:p>
@@ -27596,7 +27451,7 @@
           <a:p>
             <a:fld id="{8E1C3551-4691-492D-A7B3-905DCA39CACC}" type="datetimeFigureOut">
               <a:rPr lang="en-US" smtClean="0"/>
-              <a:t>4/24/2018</a:t>
+              <a:t>6/27/2018</a:t>
             </a:fld>
             <a:endParaRPr lang="en-US"/>
           </a:p>
@@ -27871,7 +27726,7 @@
           <a:p>
             <a:fld id="{8E1C3551-4691-492D-A7B3-905DCA39CACC}" type="datetimeFigureOut">
               <a:rPr lang="en-US" smtClean="0"/>
-              <a:t>4/24/2018</a:t>
+              <a:t>6/27/2018</a:t>
             </a:fld>
             <a:endParaRPr lang="en-US"/>
           </a:p>
@@ -28123,7 +27978,7 @@
           <a:p>
             <a:fld id="{8E1C3551-4691-492D-A7B3-905DCA39CACC}" type="datetimeFigureOut">
               <a:rPr lang="en-US" smtClean="0"/>
-              <a:t>4/24/2018</a:t>
+              <a:t>6/27/2018</a:t>
             </a:fld>
             <a:endParaRPr lang="en-US"/>
           </a:p>
@@ -28291,7 +28146,7 @@
           <a:p>
             <a:fld id="{8E1C3551-4691-492D-A7B3-905DCA39CACC}" type="datetimeFigureOut">
               <a:rPr lang="en-US" smtClean="0"/>
-              <a:t>4/24/2018</a:t>
+              <a:t>6/27/2018</a:t>
             </a:fld>
             <a:endParaRPr lang="en-US"/>
           </a:p>
@@ -28469,7 +28324,7 @@
           <a:p>
             <a:fld id="{8E1C3551-4691-492D-A7B3-905DCA39CACC}" type="datetimeFigureOut">
               <a:rPr lang="en-US" smtClean="0"/>
-              <a:t>4/24/2018</a:t>
+              <a:t>6/27/2018</a:t>
             </a:fld>
             <a:endParaRPr lang="en-US"/>
           </a:p>
@@ -32885,7 +32740,7 @@
           <a:p>
             <a:fld id="{40DB40CD-1F4C-4AE8-81E2-E5C7743C6DB9}" type="datetimeFigureOut">
               <a:rPr lang="en-GB" smtClean="0"/>
-              <a:t>24/04/2018</a:t>
+              <a:t>27/06/2018</a:t>
             </a:fld>
             <a:endParaRPr lang="en-GB"/>
           </a:p>
@@ -35437,7 +35292,7 @@
           <a:p>
             <a:fld id="{8E1C3551-4691-492D-A7B3-905DCA39CACC}" type="datetimeFigureOut">
               <a:rPr lang="en-US" smtClean="0"/>
-              <a:t>4/24/2018</a:t>
+              <a:t>6/27/2018</a:t>
             </a:fld>
             <a:endParaRPr lang="en-US"/>
           </a:p>
@@ -38389,16 +38244,6 @@
           <a:p>
             <a:r>
               <a:rPr lang="en-US" sz="2800" dirty="0"/>
-              <a:t>Define a high level Bot Flow Logic for the organization</a:t>
-            </a:r>
-            <a:br>
-              <a:rPr lang="en-US" sz="2800" dirty="0"/>
-            </a:br>
-            <a:endParaRPr lang="en-US" sz="2800" dirty="0"/>
-          </a:p>
-          <a:p>
-            <a:r>
-              <a:rPr lang="en-US" sz="2800" dirty="0"/>
               <a:t>Define a Bot Roadmap for the organization</a:t>
             </a:r>
           </a:p>
@@ -41728,1147 +41573,6 @@
         </p:nvSpPr>
         <p:spPr>
           <a:xfrm>
-            <a:off x="646547" y="665560"/>
-            <a:ext cx="4863003" cy="425758"/>
-          </a:xfrm>
-          <a:prstGeom prst="rect">
-            <a:avLst/>
-          </a:prstGeom>
-        </p:spPr>
-        <p:txBody>
-          <a:bodyPr wrap="square">
-            <a:spAutoFit/>
-          </a:bodyPr>
-          <a:lstStyle/>
-          <a:p>
-            <a:pPr defTabSz="1219170">
-              <a:lnSpc>
-                <a:spcPts val="2600"/>
-              </a:lnSpc>
-              <a:defRPr/>
-            </a:pPr>
-            <a:r>
-              <a:rPr lang="en-US" sz="2800" b="1" spc="-133" dirty="0">
-                <a:solidFill>
-                  <a:srgbClr val="273160"/>
-                </a:solidFill>
-                <a:latin typeface="Segoe UI" panose="020B0502040204020203" pitchFamily="34" charset="0"/>
-                <a:cs typeface="Segoe UI" panose="020B0502040204020203" pitchFamily="34" charset="0"/>
-              </a:rPr>
-              <a:t>HIGH LEVEL BOT LOGIC FLOW</a:t>
-            </a:r>
-          </a:p>
-        </p:txBody>
-      </p:sp>
-      <p:sp>
-        <p:nvSpPr>
-          <p:cNvPr id="9" name="Rectangle 8">
-            <a:extLst>
-              <a:ext uri="{FF2B5EF4-FFF2-40B4-BE49-F238E27FC236}">
-                <a16:creationId xmlns:a16="http://schemas.microsoft.com/office/drawing/2014/main" id="{78F6D888-3D59-495B-87E0-51926D94DBB5}"/>
-              </a:ext>
-            </a:extLst>
-          </p:cNvPr>
-          <p:cNvSpPr/>
-          <p:nvPr/>
-        </p:nvSpPr>
-        <p:spPr>
-          <a:xfrm>
-            <a:off x="0" y="6732547"/>
-            <a:ext cx="12192000" cy="125453"/>
-          </a:xfrm>
-          <a:prstGeom prst="rect">
-            <a:avLst/>
-          </a:prstGeom>
-          <a:solidFill>
-            <a:srgbClr val="0069AA"/>
-          </a:solidFill>
-          <a:ln>
-            <a:noFill/>
-          </a:ln>
-        </p:spPr>
-        <p:style>
-          <a:lnRef idx="2">
-            <a:schemeClr val="accent1">
-              <a:shade val="50000"/>
-            </a:schemeClr>
-          </a:lnRef>
-          <a:fillRef idx="1">
-            <a:schemeClr val="accent1"/>
-          </a:fillRef>
-          <a:effectRef idx="0">
-            <a:schemeClr val="accent1"/>
-          </a:effectRef>
-          <a:fontRef idx="minor">
-            <a:schemeClr val="lt1"/>
-          </a:fontRef>
-        </p:style>
-        <p:txBody>
-          <a:bodyPr rtlCol="0" anchor="ctr"/>
-          <a:lstStyle/>
-          <a:p>
-            <a:pPr algn="ctr" defTabSz="1219170">
-              <a:defRPr/>
-            </a:pPr>
-            <a:endParaRPr lang="en-GB" sz="2400">
-              <a:solidFill>
-                <a:prstClr val="white"/>
-              </a:solidFill>
-              <a:latin typeface="Segoe UI Light"/>
-            </a:endParaRPr>
-          </a:p>
-        </p:txBody>
-      </p:sp>
-      <p:cxnSp>
-        <p:nvCxnSpPr>
-          <p:cNvPr id="19" name="Straight Connector 18">
-            <a:extLst>
-              <a:ext uri="{FF2B5EF4-FFF2-40B4-BE49-F238E27FC236}">
-                <a16:creationId xmlns:a16="http://schemas.microsoft.com/office/drawing/2014/main" id="{C2199506-ABC6-4D11-A5E8-14EC5BD821CF}"/>
-              </a:ext>
-            </a:extLst>
-          </p:cNvPr>
-          <p:cNvCxnSpPr>
-            <a:cxnSpLocks/>
-          </p:cNvCxnSpPr>
-          <p:nvPr/>
-        </p:nvCxnSpPr>
-        <p:spPr>
-          <a:xfrm>
-            <a:off x="455168" y="728260"/>
-            <a:ext cx="0" cy="615400"/>
-          </a:xfrm>
-          <a:prstGeom prst="line">
-            <a:avLst/>
-          </a:prstGeom>
-          <a:ln w="57150">
-            <a:solidFill>
-              <a:srgbClr val="0069AA"/>
-            </a:solidFill>
-          </a:ln>
-        </p:spPr>
-        <p:style>
-          <a:lnRef idx="1">
-            <a:schemeClr val="accent1"/>
-          </a:lnRef>
-          <a:fillRef idx="0">
-            <a:schemeClr val="accent1"/>
-          </a:fillRef>
-          <a:effectRef idx="0">
-            <a:schemeClr val="accent1"/>
-          </a:effectRef>
-          <a:fontRef idx="minor">
-            <a:schemeClr val="tx1"/>
-          </a:fontRef>
-        </p:style>
-      </p:cxnSp>
-      <p:sp>
-        <p:nvSpPr>
-          <p:cNvPr id="20" name="Rectangle 19">
-            <a:extLst>
-              <a:ext uri="{FF2B5EF4-FFF2-40B4-BE49-F238E27FC236}">
-                <a16:creationId xmlns:a16="http://schemas.microsoft.com/office/drawing/2014/main" id="{EC4868E2-A7C8-4602-93D6-C04947DB44A4}"/>
-              </a:ext>
-            </a:extLst>
-          </p:cNvPr>
-          <p:cNvSpPr/>
-          <p:nvPr/>
-        </p:nvSpPr>
-        <p:spPr>
-          <a:xfrm>
-            <a:off x="646548" y="1035960"/>
-            <a:ext cx="10953025" cy="623077"/>
-          </a:xfrm>
-          <a:prstGeom prst="rect">
-            <a:avLst/>
-          </a:prstGeom>
-        </p:spPr>
-        <p:txBody>
-          <a:bodyPr wrap="square">
-            <a:noAutofit/>
-          </a:bodyPr>
-          <a:lstStyle/>
-          <a:p>
-            <a:pPr defTabSz="1219170">
-              <a:defRPr/>
-            </a:pPr>
-            <a:r>
-              <a:rPr lang="en-US" sz="1200">
-                <a:solidFill>
-                  <a:prstClr val="black"/>
-                </a:solidFill>
-                <a:latin typeface="Segoe UI Light" panose="020B0502040204020203" pitchFamily="34" charset="0"/>
-                <a:cs typeface="Segoe UI Light" panose="020B0502040204020203" pitchFamily="34" charset="0"/>
-              </a:rPr>
-              <a:t>Here is a high level logic flow for the bot starting with Top Intents.</a:t>
-            </a:r>
-          </a:p>
-        </p:txBody>
-      </p:sp>
-      <p:sp>
-        <p:nvSpPr>
-          <p:cNvPr id="34" name="Rectangle: Rounded Corners 33">
-            <a:extLst>
-              <a:ext uri="{FF2B5EF4-FFF2-40B4-BE49-F238E27FC236}">
-                <a16:creationId xmlns:a16="http://schemas.microsoft.com/office/drawing/2014/main" id="{081B4D8F-4A3F-4906-97B1-037CD80BFBD2}"/>
-              </a:ext>
-            </a:extLst>
-          </p:cNvPr>
-          <p:cNvSpPr/>
-          <p:nvPr/>
-        </p:nvSpPr>
-        <p:spPr>
-          <a:xfrm>
-            <a:off x="2827541" y="2745532"/>
-            <a:ext cx="1074219" cy="370401"/>
-          </a:xfrm>
-          <a:prstGeom prst="roundRect">
-            <a:avLst/>
-          </a:prstGeom>
-          <a:solidFill>
-            <a:schemeClr val="bg1">
-              <a:lumMod val="85000"/>
-            </a:schemeClr>
-          </a:solidFill>
-          <a:ln w="12700"/>
-        </p:spPr>
-        <p:style>
-          <a:lnRef idx="2">
-            <a:schemeClr val="dk1"/>
-          </a:lnRef>
-          <a:fillRef idx="1">
-            <a:schemeClr val="lt1"/>
-          </a:fillRef>
-          <a:effectRef idx="0">
-            <a:schemeClr val="dk1"/>
-          </a:effectRef>
-          <a:fontRef idx="minor">
-            <a:schemeClr val="dk1"/>
-          </a:fontRef>
-        </p:style>
-        <p:txBody>
-          <a:bodyPr rtlCol="0" anchor="ctr"/>
-          <a:lstStyle/>
-          <a:p>
-            <a:pPr algn="ctr" defTabSz="1219170"/>
-            <a:r>
-              <a:rPr lang="en-US" sz="1067" dirty="0">
-                <a:solidFill>
-                  <a:prstClr val="black"/>
-                </a:solidFill>
-                <a:latin typeface="Segoe UI Light"/>
-              </a:rPr>
-              <a:t>Get video</a:t>
-            </a:r>
-          </a:p>
-        </p:txBody>
-      </p:sp>
-      <p:sp>
-        <p:nvSpPr>
-          <p:cNvPr id="35" name="Rectangle: Rounded Corners 34">
-            <a:extLst>
-              <a:ext uri="{FF2B5EF4-FFF2-40B4-BE49-F238E27FC236}">
-                <a16:creationId xmlns:a16="http://schemas.microsoft.com/office/drawing/2014/main" id="{20148BD2-1970-474D-A4DA-EF5A6EB85852}"/>
-              </a:ext>
-            </a:extLst>
-          </p:cNvPr>
-          <p:cNvSpPr/>
-          <p:nvPr/>
-        </p:nvSpPr>
-        <p:spPr>
-          <a:xfrm>
-            <a:off x="2827541" y="2745532"/>
-            <a:ext cx="2229349" cy="370401"/>
-          </a:xfrm>
-          <a:prstGeom prst="roundRect">
-            <a:avLst/>
-          </a:prstGeom>
-          <a:solidFill>
-            <a:schemeClr val="bg1">
-              <a:lumMod val="85000"/>
-            </a:schemeClr>
-          </a:solidFill>
-          <a:ln w="12700"/>
-        </p:spPr>
-        <p:style>
-          <a:lnRef idx="2">
-            <a:schemeClr val="dk1"/>
-          </a:lnRef>
-          <a:fillRef idx="1">
-            <a:schemeClr val="lt1"/>
-          </a:fillRef>
-          <a:effectRef idx="0">
-            <a:schemeClr val="dk1"/>
-          </a:effectRef>
-          <a:fontRef idx="minor">
-            <a:schemeClr val="dk1"/>
-          </a:fontRef>
-        </p:style>
-        <p:txBody>
-          <a:bodyPr rtlCol="0" anchor="ctr"/>
-          <a:lstStyle/>
-          <a:p>
-            <a:pPr algn="ctr" defTabSz="1219170"/>
-            <a:r>
-              <a:rPr lang="en-US" sz="1067" dirty="0">
-                <a:solidFill>
-                  <a:prstClr val="black"/>
-                </a:solidFill>
-                <a:latin typeface="Segoe UI Light"/>
-              </a:rPr>
-              <a:t>?</a:t>
-            </a:r>
-          </a:p>
-        </p:txBody>
-      </p:sp>
-      <p:sp>
-        <p:nvSpPr>
-          <p:cNvPr id="36" name="Rectangle: Rounded Corners 35">
-            <a:extLst>
-              <a:ext uri="{FF2B5EF4-FFF2-40B4-BE49-F238E27FC236}">
-                <a16:creationId xmlns:a16="http://schemas.microsoft.com/office/drawing/2014/main" id="{98869BA4-D50C-44AE-8161-07F7A52FEDD2}"/>
-              </a:ext>
-            </a:extLst>
-          </p:cNvPr>
-          <p:cNvSpPr/>
-          <p:nvPr/>
-        </p:nvSpPr>
-        <p:spPr>
-          <a:xfrm>
-            <a:off x="5137800" y="2745532"/>
-            <a:ext cx="2229349" cy="370401"/>
-          </a:xfrm>
-          <a:prstGeom prst="roundRect">
-            <a:avLst/>
-          </a:prstGeom>
-          <a:solidFill>
-            <a:schemeClr val="bg1">
-              <a:lumMod val="85000"/>
-            </a:schemeClr>
-          </a:solidFill>
-          <a:ln w="12700"/>
-        </p:spPr>
-        <p:style>
-          <a:lnRef idx="2">
-            <a:schemeClr val="dk1"/>
-          </a:lnRef>
-          <a:fillRef idx="1">
-            <a:schemeClr val="lt1"/>
-          </a:fillRef>
-          <a:effectRef idx="0">
-            <a:schemeClr val="dk1"/>
-          </a:effectRef>
-          <a:fontRef idx="minor">
-            <a:schemeClr val="dk1"/>
-          </a:fontRef>
-        </p:style>
-        <p:txBody>
-          <a:bodyPr rtlCol="0" anchor="ctr"/>
-          <a:lstStyle/>
-          <a:p>
-            <a:pPr algn="ctr" defTabSz="1219170"/>
-            <a:r>
-              <a:rPr lang="en-US" sz="1067" dirty="0">
-                <a:solidFill>
-                  <a:prstClr val="black"/>
-                </a:solidFill>
-                <a:latin typeface="Segoe UI Light"/>
-              </a:rPr>
-              <a:t>?</a:t>
-            </a:r>
-          </a:p>
-        </p:txBody>
-      </p:sp>
-      <p:sp>
-        <p:nvSpPr>
-          <p:cNvPr id="38" name="Rectangle: Rounded Corners 37">
-            <a:extLst>
-              <a:ext uri="{FF2B5EF4-FFF2-40B4-BE49-F238E27FC236}">
-                <a16:creationId xmlns:a16="http://schemas.microsoft.com/office/drawing/2014/main" id="{E7DEEE4C-54AE-49A9-AEB7-C08DAD1C06E5}"/>
-              </a:ext>
-            </a:extLst>
-          </p:cNvPr>
-          <p:cNvSpPr/>
-          <p:nvPr/>
-        </p:nvSpPr>
-        <p:spPr>
-          <a:xfrm>
-            <a:off x="7448059" y="2745532"/>
-            <a:ext cx="2229349" cy="370401"/>
-          </a:xfrm>
-          <a:prstGeom prst="roundRect">
-            <a:avLst/>
-          </a:prstGeom>
-          <a:solidFill>
-            <a:schemeClr val="bg1">
-              <a:lumMod val="85000"/>
-            </a:schemeClr>
-          </a:solidFill>
-          <a:ln w="12700"/>
-        </p:spPr>
-        <p:style>
-          <a:lnRef idx="2">
-            <a:schemeClr val="dk1"/>
-          </a:lnRef>
-          <a:fillRef idx="1">
-            <a:schemeClr val="lt1"/>
-          </a:fillRef>
-          <a:effectRef idx="0">
-            <a:schemeClr val="dk1"/>
-          </a:effectRef>
-          <a:fontRef idx="minor">
-            <a:schemeClr val="dk1"/>
-          </a:fontRef>
-        </p:style>
-        <p:txBody>
-          <a:bodyPr rtlCol="0" anchor="ctr"/>
-          <a:lstStyle/>
-          <a:p>
-            <a:pPr algn="ctr" defTabSz="1219170"/>
-            <a:r>
-              <a:rPr lang="en-US" sz="1067" dirty="0">
-                <a:solidFill>
-                  <a:prstClr val="black"/>
-                </a:solidFill>
-                <a:latin typeface="Segoe UI Light"/>
-              </a:rPr>
-              <a:t>?</a:t>
-            </a:r>
-          </a:p>
-        </p:txBody>
-      </p:sp>
-      <p:sp>
-        <p:nvSpPr>
-          <p:cNvPr id="40" name="Rectangle: Rounded Corners 39">
-            <a:extLst>
-              <a:ext uri="{FF2B5EF4-FFF2-40B4-BE49-F238E27FC236}">
-                <a16:creationId xmlns:a16="http://schemas.microsoft.com/office/drawing/2014/main" id="{B1DD869E-2CA7-4240-A610-17ED9FE233BC}"/>
-              </a:ext>
-            </a:extLst>
-          </p:cNvPr>
-          <p:cNvSpPr/>
-          <p:nvPr/>
-        </p:nvSpPr>
-        <p:spPr>
-          <a:xfrm>
-            <a:off x="9758317" y="2745532"/>
-            <a:ext cx="2229350" cy="370401"/>
-          </a:xfrm>
-          <a:prstGeom prst="roundRect">
-            <a:avLst/>
-          </a:prstGeom>
-          <a:solidFill>
-            <a:schemeClr val="bg1">
-              <a:lumMod val="85000"/>
-            </a:schemeClr>
-          </a:solidFill>
-          <a:ln w="12700"/>
-        </p:spPr>
-        <p:style>
-          <a:lnRef idx="2">
-            <a:schemeClr val="dk1"/>
-          </a:lnRef>
-          <a:fillRef idx="1">
-            <a:schemeClr val="lt1"/>
-          </a:fillRef>
-          <a:effectRef idx="0">
-            <a:schemeClr val="dk1"/>
-          </a:effectRef>
-          <a:fontRef idx="minor">
-            <a:schemeClr val="dk1"/>
-          </a:fontRef>
-        </p:style>
-        <p:txBody>
-          <a:bodyPr rtlCol="0" anchor="ctr"/>
-          <a:lstStyle/>
-          <a:p>
-            <a:pPr algn="ctr" defTabSz="1219170"/>
-            <a:r>
-              <a:rPr lang="en-US" sz="1067" dirty="0">
-                <a:solidFill>
-                  <a:prstClr val="black"/>
-                </a:solidFill>
-                <a:latin typeface="Segoe UI Light"/>
-              </a:rPr>
-              <a:t>?</a:t>
-            </a:r>
-          </a:p>
-        </p:txBody>
-      </p:sp>
-      <p:sp>
-        <p:nvSpPr>
-          <p:cNvPr id="42" name="Rectangle 41">
-            <a:extLst>
-              <a:ext uri="{FF2B5EF4-FFF2-40B4-BE49-F238E27FC236}">
-                <a16:creationId xmlns:a16="http://schemas.microsoft.com/office/drawing/2014/main" id="{4CFFE607-A607-4A38-8572-4F0A740EE802}"/>
-              </a:ext>
-            </a:extLst>
-          </p:cNvPr>
-          <p:cNvSpPr/>
-          <p:nvPr/>
-        </p:nvSpPr>
-        <p:spPr>
-          <a:xfrm>
-            <a:off x="455168" y="2761455"/>
-            <a:ext cx="2229349" cy="338554"/>
-          </a:xfrm>
-          <a:prstGeom prst="rect">
-            <a:avLst/>
-          </a:prstGeom>
-        </p:spPr>
-        <p:txBody>
-          <a:bodyPr wrap="square">
-            <a:spAutoFit/>
-          </a:bodyPr>
-          <a:lstStyle/>
-          <a:p>
-            <a:pPr algn="ctr" defTabSz="1219170"/>
-            <a:r>
-              <a:rPr lang="en-US" sz="1600" dirty="0">
-                <a:solidFill>
-                  <a:prstClr val="black"/>
-                </a:solidFill>
-                <a:latin typeface="Segoe UI Light"/>
-              </a:rPr>
-              <a:t>Top Business Intents</a:t>
-            </a:r>
-          </a:p>
-        </p:txBody>
-      </p:sp>
-      <p:sp>
-        <p:nvSpPr>
-          <p:cNvPr id="44" name="Rectangle: Rounded Corners 43">
-            <a:extLst>
-              <a:ext uri="{FF2B5EF4-FFF2-40B4-BE49-F238E27FC236}">
-                <a16:creationId xmlns:a16="http://schemas.microsoft.com/office/drawing/2014/main" id="{9A408E2E-D36E-4A08-8213-CC927972AFF8}"/>
-              </a:ext>
-            </a:extLst>
-          </p:cNvPr>
-          <p:cNvSpPr/>
-          <p:nvPr/>
-        </p:nvSpPr>
-        <p:spPr>
-          <a:xfrm>
-            <a:off x="2827541" y="1739395"/>
-            <a:ext cx="9160126" cy="370401"/>
-          </a:xfrm>
-          <a:prstGeom prst="roundRect">
-            <a:avLst/>
-          </a:prstGeom>
-          <a:solidFill>
-            <a:schemeClr val="bg1">
-              <a:lumMod val="85000"/>
-            </a:schemeClr>
-          </a:solidFill>
-          <a:ln w="12700"/>
-        </p:spPr>
-        <p:style>
-          <a:lnRef idx="2">
-            <a:schemeClr val="dk1"/>
-          </a:lnRef>
-          <a:fillRef idx="1">
-            <a:schemeClr val="lt1"/>
-          </a:fillRef>
-          <a:effectRef idx="0">
-            <a:schemeClr val="dk1"/>
-          </a:effectRef>
-          <a:fontRef idx="minor">
-            <a:schemeClr val="dk1"/>
-          </a:fontRef>
-        </p:style>
-        <p:txBody>
-          <a:bodyPr rtlCol="0" anchor="ctr"/>
-          <a:lstStyle/>
-          <a:p>
-            <a:pPr algn="ctr" defTabSz="1219170"/>
-            <a:r>
-              <a:rPr lang="en-US" sz="1067" dirty="0">
-                <a:solidFill>
-                  <a:prstClr val="black"/>
-                </a:solidFill>
-                <a:latin typeface="Segoe UI Light"/>
-              </a:rPr>
-              <a:t>?</a:t>
-            </a:r>
-          </a:p>
-        </p:txBody>
-      </p:sp>
-      <p:sp>
-        <p:nvSpPr>
-          <p:cNvPr id="67" name="Rectangle 66">
-            <a:extLst>
-              <a:ext uri="{FF2B5EF4-FFF2-40B4-BE49-F238E27FC236}">
-                <a16:creationId xmlns:a16="http://schemas.microsoft.com/office/drawing/2014/main" id="{AF85CF70-63AE-4C4B-9F00-4444B3A029E2}"/>
-              </a:ext>
-            </a:extLst>
-          </p:cNvPr>
-          <p:cNvSpPr/>
-          <p:nvPr/>
-        </p:nvSpPr>
-        <p:spPr>
-          <a:xfrm>
-            <a:off x="646547" y="1755318"/>
-            <a:ext cx="1635384" cy="338554"/>
-          </a:xfrm>
-          <a:prstGeom prst="rect">
-            <a:avLst/>
-          </a:prstGeom>
-        </p:spPr>
-        <p:txBody>
-          <a:bodyPr wrap="none">
-            <a:spAutoFit/>
-          </a:bodyPr>
-          <a:lstStyle/>
-          <a:p>
-            <a:pPr algn="ctr" defTabSz="1219170"/>
-            <a:r>
-              <a:rPr lang="en-US" sz="1600" dirty="0">
-                <a:solidFill>
-                  <a:prstClr val="black"/>
-                </a:solidFill>
-                <a:latin typeface="Segoe UI Light"/>
-              </a:rPr>
-              <a:t>Business Domain</a:t>
-            </a:r>
-          </a:p>
-        </p:txBody>
-      </p:sp>
-      <p:sp>
-        <p:nvSpPr>
-          <p:cNvPr id="71" name="Rectangle: Rounded Corners 70">
-            <a:extLst>
-              <a:ext uri="{FF2B5EF4-FFF2-40B4-BE49-F238E27FC236}">
-                <a16:creationId xmlns:a16="http://schemas.microsoft.com/office/drawing/2014/main" id="{3D1CA083-BAE2-4651-B7E9-A8CE2655E569}"/>
-              </a:ext>
-            </a:extLst>
-          </p:cNvPr>
-          <p:cNvSpPr/>
-          <p:nvPr/>
-        </p:nvSpPr>
-        <p:spPr>
-          <a:xfrm>
-            <a:off x="2827541" y="3779933"/>
-            <a:ext cx="1074219" cy="370401"/>
-          </a:xfrm>
-          <a:prstGeom prst="roundRect">
-            <a:avLst/>
-          </a:prstGeom>
-          <a:solidFill>
-            <a:schemeClr val="bg1">
-              <a:lumMod val="85000"/>
-            </a:schemeClr>
-          </a:solidFill>
-          <a:ln w="12700"/>
-        </p:spPr>
-        <p:style>
-          <a:lnRef idx="2">
-            <a:schemeClr val="dk1"/>
-          </a:lnRef>
-          <a:fillRef idx="1">
-            <a:schemeClr val="lt1"/>
-          </a:fillRef>
-          <a:effectRef idx="0">
-            <a:schemeClr val="dk1"/>
-          </a:effectRef>
-          <a:fontRef idx="minor">
-            <a:schemeClr val="dk1"/>
-          </a:fontRef>
-        </p:style>
-        <p:txBody>
-          <a:bodyPr rtlCol="0" anchor="ctr"/>
-          <a:lstStyle/>
-          <a:p>
-            <a:pPr algn="ctr" defTabSz="1219170"/>
-            <a:r>
-              <a:rPr lang="en-US" sz="1067" dirty="0">
-                <a:solidFill>
-                  <a:prstClr val="black"/>
-                </a:solidFill>
-                <a:latin typeface="Segoe UI Light"/>
-              </a:rPr>
-              <a:t>Get video</a:t>
-            </a:r>
-          </a:p>
-        </p:txBody>
-      </p:sp>
-      <p:sp>
-        <p:nvSpPr>
-          <p:cNvPr id="72" name="Rectangle: Rounded Corners 71">
-            <a:extLst>
-              <a:ext uri="{FF2B5EF4-FFF2-40B4-BE49-F238E27FC236}">
-                <a16:creationId xmlns:a16="http://schemas.microsoft.com/office/drawing/2014/main" id="{315358A8-AE07-4FF0-84DA-3C687AB1EB5D}"/>
-              </a:ext>
-            </a:extLst>
-          </p:cNvPr>
-          <p:cNvSpPr/>
-          <p:nvPr/>
-        </p:nvSpPr>
-        <p:spPr>
-          <a:xfrm>
-            <a:off x="2827541" y="3779933"/>
-            <a:ext cx="2229349" cy="370401"/>
-          </a:xfrm>
-          <a:prstGeom prst="roundRect">
-            <a:avLst/>
-          </a:prstGeom>
-          <a:solidFill>
-            <a:schemeClr val="bg1">
-              <a:lumMod val="85000"/>
-            </a:schemeClr>
-          </a:solidFill>
-          <a:ln w="12700"/>
-        </p:spPr>
-        <p:style>
-          <a:lnRef idx="2">
-            <a:schemeClr val="dk1"/>
-          </a:lnRef>
-          <a:fillRef idx="1">
-            <a:schemeClr val="lt1"/>
-          </a:fillRef>
-          <a:effectRef idx="0">
-            <a:schemeClr val="dk1"/>
-          </a:effectRef>
-          <a:fontRef idx="minor">
-            <a:schemeClr val="dk1"/>
-          </a:fontRef>
-        </p:style>
-        <p:txBody>
-          <a:bodyPr rtlCol="0" anchor="ctr"/>
-          <a:lstStyle/>
-          <a:p>
-            <a:pPr algn="ctr" defTabSz="1219170"/>
-            <a:r>
-              <a:rPr lang="en-US" sz="1100" dirty="0">
-                <a:solidFill>
-                  <a:prstClr val="black"/>
-                </a:solidFill>
-                <a:latin typeface="Segoe UI Light"/>
-              </a:rPr>
-              <a:t>?</a:t>
-            </a:r>
-          </a:p>
-        </p:txBody>
-      </p:sp>
-      <p:sp>
-        <p:nvSpPr>
-          <p:cNvPr id="73" name="Rectangle: Rounded Corners 72">
-            <a:extLst>
-              <a:ext uri="{FF2B5EF4-FFF2-40B4-BE49-F238E27FC236}">
-                <a16:creationId xmlns:a16="http://schemas.microsoft.com/office/drawing/2014/main" id="{56AACBDA-F9F9-4702-BEE6-6CC2B72F76A3}"/>
-              </a:ext>
-            </a:extLst>
-          </p:cNvPr>
-          <p:cNvSpPr/>
-          <p:nvPr/>
-        </p:nvSpPr>
-        <p:spPr>
-          <a:xfrm>
-            <a:off x="5137799" y="3779812"/>
-            <a:ext cx="2229350" cy="370401"/>
-          </a:xfrm>
-          <a:prstGeom prst="roundRect">
-            <a:avLst/>
-          </a:prstGeom>
-          <a:solidFill>
-            <a:schemeClr val="bg1">
-              <a:lumMod val="85000"/>
-            </a:schemeClr>
-          </a:solidFill>
-          <a:ln w="12700"/>
-        </p:spPr>
-        <p:style>
-          <a:lnRef idx="2">
-            <a:schemeClr val="dk1"/>
-          </a:lnRef>
-          <a:fillRef idx="1">
-            <a:schemeClr val="lt1"/>
-          </a:fillRef>
-          <a:effectRef idx="0">
-            <a:schemeClr val="dk1"/>
-          </a:effectRef>
-          <a:fontRef idx="minor">
-            <a:schemeClr val="dk1"/>
-          </a:fontRef>
-        </p:style>
-        <p:txBody>
-          <a:bodyPr rtlCol="0" anchor="ctr"/>
-          <a:lstStyle/>
-          <a:p>
-            <a:pPr algn="ctr" defTabSz="1219170"/>
-            <a:r>
-              <a:rPr lang="en-US" sz="1100" dirty="0">
-                <a:solidFill>
-                  <a:prstClr val="black"/>
-                </a:solidFill>
-                <a:latin typeface="Segoe UI Light"/>
-              </a:rPr>
-              <a:t>?</a:t>
-            </a:r>
-          </a:p>
-        </p:txBody>
-      </p:sp>
-      <p:sp>
-        <p:nvSpPr>
-          <p:cNvPr id="74" name="Rectangle: Rounded Corners 73">
-            <a:extLst>
-              <a:ext uri="{FF2B5EF4-FFF2-40B4-BE49-F238E27FC236}">
-                <a16:creationId xmlns:a16="http://schemas.microsoft.com/office/drawing/2014/main" id="{051DCE6A-0492-4E9C-87B6-FD17967ADDAF}"/>
-              </a:ext>
-            </a:extLst>
-          </p:cNvPr>
-          <p:cNvSpPr/>
-          <p:nvPr/>
-        </p:nvSpPr>
-        <p:spPr>
-          <a:xfrm>
-            <a:off x="7448059" y="3779933"/>
-            <a:ext cx="2229349" cy="370401"/>
-          </a:xfrm>
-          <a:prstGeom prst="roundRect">
-            <a:avLst/>
-          </a:prstGeom>
-          <a:solidFill>
-            <a:schemeClr val="bg1">
-              <a:lumMod val="85000"/>
-            </a:schemeClr>
-          </a:solidFill>
-          <a:ln w="12700"/>
-        </p:spPr>
-        <p:style>
-          <a:lnRef idx="2">
-            <a:schemeClr val="dk1"/>
-          </a:lnRef>
-          <a:fillRef idx="1">
-            <a:schemeClr val="lt1"/>
-          </a:fillRef>
-          <a:effectRef idx="0">
-            <a:schemeClr val="dk1"/>
-          </a:effectRef>
-          <a:fontRef idx="minor">
-            <a:schemeClr val="dk1"/>
-          </a:fontRef>
-        </p:style>
-        <p:txBody>
-          <a:bodyPr rtlCol="0" anchor="ctr"/>
-          <a:lstStyle/>
-          <a:p>
-            <a:pPr algn="ctr" defTabSz="1219170"/>
-            <a:r>
-              <a:rPr lang="en-US" sz="1100" dirty="0">
-                <a:solidFill>
-                  <a:prstClr val="black"/>
-                </a:solidFill>
-                <a:latin typeface="Segoe UI Light"/>
-              </a:rPr>
-              <a:t>?</a:t>
-            </a:r>
-          </a:p>
-        </p:txBody>
-      </p:sp>
-      <p:sp>
-        <p:nvSpPr>
-          <p:cNvPr id="75" name="Rectangle: Rounded Corners 74">
-            <a:extLst>
-              <a:ext uri="{FF2B5EF4-FFF2-40B4-BE49-F238E27FC236}">
-                <a16:creationId xmlns:a16="http://schemas.microsoft.com/office/drawing/2014/main" id="{732174C4-8698-415B-AC6D-08A8485C38F2}"/>
-              </a:ext>
-            </a:extLst>
-          </p:cNvPr>
-          <p:cNvSpPr/>
-          <p:nvPr/>
-        </p:nvSpPr>
-        <p:spPr>
-          <a:xfrm>
-            <a:off x="9758317" y="3779933"/>
-            <a:ext cx="2229350" cy="370401"/>
-          </a:xfrm>
-          <a:prstGeom prst="roundRect">
-            <a:avLst/>
-          </a:prstGeom>
-          <a:solidFill>
-            <a:schemeClr val="bg1">
-              <a:lumMod val="85000"/>
-            </a:schemeClr>
-          </a:solidFill>
-          <a:ln w="12700"/>
-        </p:spPr>
-        <p:style>
-          <a:lnRef idx="2">
-            <a:schemeClr val="dk1"/>
-          </a:lnRef>
-          <a:fillRef idx="1">
-            <a:schemeClr val="lt1"/>
-          </a:fillRef>
-          <a:effectRef idx="0">
-            <a:schemeClr val="dk1"/>
-          </a:effectRef>
-          <a:fontRef idx="minor">
-            <a:schemeClr val="dk1"/>
-          </a:fontRef>
-        </p:style>
-        <p:txBody>
-          <a:bodyPr rtlCol="0" anchor="ctr"/>
-          <a:lstStyle/>
-          <a:p>
-            <a:pPr algn="ctr" defTabSz="1219170"/>
-            <a:r>
-              <a:rPr lang="en-US" sz="1067" dirty="0">
-                <a:solidFill>
-                  <a:prstClr val="black"/>
-                </a:solidFill>
-                <a:latin typeface="Segoe UI Light"/>
-              </a:rPr>
-              <a:t>?</a:t>
-            </a:r>
-          </a:p>
-        </p:txBody>
-      </p:sp>
-      <p:sp>
-        <p:nvSpPr>
-          <p:cNvPr id="76" name="Rectangle 75">
-            <a:extLst>
-              <a:ext uri="{FF2B5EF4-FFF2-40B4-BE49-F238E27FC236}">
-                <a16:creationId xmlns:a16="http://schemas.microsoft.com/office/drawing/2014/main" id="{8E2865E1-AC48-43B3-952D-6A9ED04B9644}"/>
-              </a:ext>
-            </a:extLst>
-          </p:cNvPr>
-          <p:cNvSpPr/>
-          <p:nvPr/>
-        </p:nvSpPr>
-        <p:spPr>
-          <a:xfrm>
-            <a:off x="557736" y="3795735"/>
-            <a:ext cx="2229349" cy="338554"/>
-          </a:xfrm>
-          <a:prstGeom prst="rect">
-            <a:avLst/>
-          </a:prstGeom>
-        </p:spPr>
-        <p:txBody>
-          <a:bodyPr wrap="square">
-            <a:spAutoFit/>
-          </a:bodyPr>
-          <a:lstStyle/>
-          <a:p>
-            <a:pPr algn="ctr" defTabSz="1219170"/>
-            <a:r>
-              <a:rPr lang="en-US" sz="1600" dirty="0">
-                <a:solidFill>
-                  <a:prstClr val="black"/>
-                </a:solidFill>
-                <a:latin typeface="Segoe UI Light"/>
-              </a:rPr>
-              <a:t>Conversation Patterns</a:t>
-            </a:r>
-          </a:p>
-        </p:txBody>
-      </p:sp>
-      <p:sp>
-        <p:nvSpPr>
-          <p:cNvPr id="77" name="Rectangle: Rounded Corners 76">
-            <a:extLst>
-              <a:ext uri="{FF2B5EF4-FFF2-40B4-BE49-F238E27FC236}">
-                <a16:creationId xmlns:a16="http://schemas.microsoft.com/office/drawing/2014/main" id="{0549676C-CD12-41C0-A653-2F87E5B67C60}"/>
-              </a:ext>
-            </a:extLst>
-          </p:cNvPr>
-          <p:cNvSpPr/>
-          <p:nvPr/>
-        </p:nvSpPr>
-        <p:spPr>
-          <a:xfrm>
-            <a:off x="2827541" y="4747062"/>
-            <a:ext cx="1074219" cy="370401"/>
-          </a:xfrm>
-          <a:prstGeom prst="roundRect">
-            <a:avLst/>
-          </a:prstGeom>
-          <a:solidFill>
-            <a:schemeClr val="bg1">
-              <a:lumMod val="85000"/>
-            </a:schemeClr>
-          </a:solidFill>
-          <a:ln w="12700"/>
-        </p:spPr>
-        <p:style>
-          <a:lnRef idx="2">
-            <a:schemeClr val="dk1"/>
-          </a:lnRef>
-          <a:fillRef idx="1">
-            <a:schemeClr val="lt1"/>
-          </a:fillRef>
-          <a:effectRef idx="0">
-            <a:schemeClr val="dk1"/>
-          </a:effectRef>
-          <a:fontRef idx="minor">
-            <a:schemeClr val="dk1"/>
-          </a:fontRef>
-        </p:style>
-        <p:txBody>
-          <a:bodyPr rtlCol="0" anchor="ctr"/>
-          <a:lstStyle/>
-          <a:p>
-            <a:pPr algn="ctr" defTabSz="1219170"/>
-            <a:r>
-              <a:rPr lang="en-US" sz="1067" dirty="0">
-                <a:solidFill>
-                  <a:prstClr val="black"/>
-                </a:solidFill>
-                <a:latin typeface="Segoe UI Light"/>
-              </a:rPr>
-              <a:t>Get video</a:t>
-            </a:r>
-          </a:p>
-        </p:txBody>
-      </p:sp>
-      <p:sp>
-        <p:nvSpPr>
-          <p:cNvPr id="78" name="Rectangle: Rounded Corners 77">
-            <a:extLst>
-              <a:ext uri="{FF2B5EF4-FFF2-40B4-BE49-F238E27FC236}">
-                <a16:creationId xmlns:a16="http://schemas.microsoft.com/office/drawing/2014/main" id="{134480A0-A8B7-46C9-8AA0-6F6A9E5859AB}"/>
-              </a:ext>
-            </a:extLst>
-          </p:cNvPr>
-          <p:cNvSpPr/>
-          <p:nvPr/>
-        </p:nvSpPr>
-        <p:spPr>
-          <a:xfrm>
-            <a:off x="2827541" y="4747062"/>
-            <a:ext cx="2229349" cy="370401"/>
-          </a:xfrm>
-          <a:prstGeom prst="roundRect">
-            <a:avLst/>
-          </a:prstGeom>
-          <a:solidFill>
-            <a:schemeClr val="bg1">
-              <a:lumMod val="85000"/>
-            </a:schemeClr>
-          </a:solidFill>
-          <a:ln w="12700"/>
-        </p:spPr>
-        <p:style>
-          <a:lnRef idx="2">
-            <a:schemeClr val="dk1"/>
-          </a:lnRef>
-          <a:fillRef idx="1">
-            <a:schemeClr val="lt1"/>
-          </a:fillRef>
-          <a:effectRef idx="0">
-            <a:schemeClr val="dk1"/>
-          </a:effectRef>
-          <a:fontRef idx="minor">
-            <a:schemeClr val="dk1"/>
-          </a:fontRef>
-        </p:style>
-        <p:txBody>
-          <a:bodyPr rtlCol="0" anchor="ctr"/>
-          <a:lstStyle/>
-          <a:p>
-            <a:pPr algn="ctr" defTabSz="1219170"/>
-            <a:r>
-              <a:rPr lang="en-US" sz="1100" dirty="0">
-                <a:solidFill>
-                  <a:prstClr val="black"/>
-                </a:solidFill>
-                <a:latin typeface="Segoe UI Light"/>
-              </a:rPr>
-              <a:t>?</a:t>
-            </a:r>
-          </a:p>
-        </p:txBody>
-      </p:sp>
-      <p:sp>
-        <p:nvSpPr>
-          <p:cNvPr id="82" name="Rectangle 81">
-            <a:extLst>
-              <a:ext uri="{FF2B5EF4-FFF2-40B4-BE49-F238E27FC236}">
-                <a16:creationId xmlns:a16="http://schemas.microsoft.com/office/drawing/2014/main" id="{3BDF2A30-57D7-435D-9F5F-1BD7AEB7130B}"/>
-              </a:ext>
-            </a:extLst>
-          </p:cNvPr>
-          <p:cNvSpPr/>
-          <p:nvPr/>
-        </p:nvSpPr>
-        <p:spPr>
-          <a:xfrm>
-            <a:off x="557736" y="4762864"/>
-            <a:ext cx="2344747" cy="338554"/>
-          </a:xfrm>
-          <a:prstGeom prst="rect">
-            <a:avLst/>
-          </a:prstGeom>
-        </p:spPr>
-        <p:txBody>
-          <a:bodyPr wrap="square">
-            <a:spAutoFit/>
-          </a:bodyPr>
-          <a:lstStyle/>
-          <a:p>
-            <a:pPr algn="ctr" defTabSz="1219170"/>
-            <a:r>
-              <a:rPr lang="en-US" sz="1600" dirty="0">
-                <a:solidFill>
-                  <a:prstClr val="black"/>
-                </a:solidFill>
-                <a:latin typeface="Segoe UI Light"/>
-              </a:rPr>
-              <a:t>Additional Requirements</a:t>
-            </a:r>
-          </a:p>
-        </p:txBody>
-      </p:sp>
-    </p:spTree>
-    <p:extLst>
-      <p:ext uri="{BB962C8B-B14F-4D97-AF65-F5344CB8AC3E}">
-        <p14:creationId xmlns:p14="http://schemas.microsoft.com/office/powerpoint/2010/main" val="292569403"/>
-      </p:ext>
-    </p:extLst>
-  </p:cSld>
-  <p:clrMapOvr>
-    <a:masterClrMapping/>
-  </p:clrMapOvr>
-  <mc:AlternateContent xmlns:mc="http://schemas.openxmlformats.org/markup-compatibility/2006" xmlns:p14="http://schemas.microsoft.com/office/powerpoint/2010/main">
-    <mc:Choice Requires="p14">
-      <p:transition p14:dur="250">
-        <p:fade/>
-      </p:transition>
-    </mc:Choice>
-    <mc:Fallback xmlns="">
-      <p:transition>
-        <p:fade/>
-      </p:transition>
-    </mc:Fallback>
-  </mc:AlternateContent>
-</p:sld>
-</file>
-
-<file path=ppt/slides/slide7.xml><?xml version="1.0" encoding="utf-8"?>
-<p:sld xmlns:a="http://schemas.openxmlformats.org/drawingml/2006/main" xmlns:r="http://schemas.openxmlformats.org/officeDocument/2006/relationships" xmlns:p="http://schemas.openxmlformats.org/presentationml/2006/main">
-  <p:cSld>
-    <p:spTree>
-      <p:nvGrpSpPr>
-        <p:cNvPr id="1" name=""/>
-        <p:cNvGrpSpPr/>
-        <p:nvPr/>
-      </p:nvGrpSpPr>
-      <p:grpSpPr>
-        <a:xfrm>
-          <a:off x="0" y="0"/>
-          <a:ext cx="0" cy="0"/>
-          <a:chOff x="0" y="0"/>
-          <a:chExt cx="0" cy="0"/>
-        </a:xfrm>
-      </p:grpSpPr>
-      <p:sp>
-        <p:nvSpPr>
-          <p:cNvPr id="10" name="Rectangle 9"/>
-          <p:cNvSpPr/>
-          <p:nvPr/>
-        </p:nvSpPr>
-        <p:spPr>
-          <a:xfrm>
             <a:off x="646547" y="665561"/>
             <a:ext cx="7700638" cy="425758"/>
           </a:xfrm>
@@ -43664,7 +42368,7 @@
 </p:sld>
 </file>
 
-<file path=ppt/slides/slide8.xml><?xml version="1.0" encoding="utf-8"?>
+<file path=ppt/slides/slide7.xml><?xml version="1.0" encoding="utf-8"?>
 <p:sld xmlns:a="http://schemas.openxmlformats.org/drawingml/2006/main" xmlns:r="http://schemas.openxmlformats.org/officeDocument/2006/relationships" xmlns:p="http://schemas.openxmlformats.org/presentationml/2006/main">
   <p:cSld>
     <p:bg>
@@ -45550,19 +44254,12 @@
 </file>
 
 <file path=customXml/item1.xml><?xml version="1.0" encoding="utf-8"?>
-<p:properties xmlns:p="http://schemas.microsoft.com/office/2006/metadata/properties" xmlns:xsi="http://www.w3.org/2001/XMLSchema-instance" xmlns:pc="http://schemas.microsoft.com/office/infopath/2007/PartnerControls">
-  <documentManagement>
-    <LastSharedByUser xmlns="8f159844-3118-4b08-9ac0-0a51e3431bb6">v-karfis@microsoft.com</LastSharedByUser>
-    <SharedWithUsers xmlns="8f159844-3118-4b08-9ac0-0a51e3431bb6">
-      <UserInfo>
-        <DisplayName>Natalie Nurock</DisplayName>
-        <AccountId>85</AccountId>
-        <AccountType/>
-      </UserInfo>
-    </SharedWithUsers>
-    <LastSharedByTime xmlns="8f159844-3118-4b08-9ac0-0a51e3431bb6">2018-03-14T05:42:29+00:00</LastSharedByTime>
-  </documentManagement>
-</p:properties>
+<?mso-contentType ?>
+<FormTemplates xmlns="http://schemas.microsoft.com/sharepoint/v3/contenttype/forms">
+  <Display>DocumentLibraryForm</Display>
+  <Edit>DocumentLibraryForm</Edit>
+  <New>DocumentLibraryForm</New>
+</FormTemplates>
 </file>
 
 <file path=customXml/item2.xml><?xml version="1.0" encoding="utf-8"?>
@@ -45743,27 +44440,25 @@
 </file>
 
 <file path=customXml/item3.xml><?xml version="1.0" encoding="utf-8"?>
-<?mso-contentType ?>
-<FormTemplates xmlns="http://schemas.microsoft.com/sharepoint/v3/contenttype/forms">
-  <Display>DocumentLibraryForm</Display>
-  <Edit>DocumentLibraryForm</Edit>
-  <New>DocumentLibraryForm</New>
-</FormTemplates>
+<p:properties xmlns:p="http://schemas.microsoft.com/office/2006/metadata/properties" xmlns:xsi="http://www.w3.org/2001/XMLSchema-instance" xmlns:pc="http://schemas.microsoft.com/office/infopath/2007/PartnerControls">
+  <documentManagement>
+    <LastSharedByUser xmlns="8f159844-3118-4b08-9ac0-0a51e3431bb6">v-karfis@microsoft.com</LastSharedByUser>
+    <SharedWithUsers xmlns="8f159844-3118-4b08-9ac0-0a51e3431bb6">
+      <UserInfo>
+        <DisplayName>Natalie Nurock</DisplayName>
+        <AccountId>85</AccountId>
+        <AccountType/>
+      </UserInfo>
+    </SharedWithUsers>
+    <LastSharedByTime xmlns="8f159844-3118-4b08-9ac0-0a51e3431bb6">2018-03-14T05:42:29+00:00</LastSharedByTime>
+  </documentManagement>
+</p:properties>
 </file>
 
 <file path=customXml/itemProps1.xml><?xml version="1.0" encoding="utf-8"?>
-<ds:datastoreItem xmlns:ds="http://schemas.openxmlformats.org/officeDocument/2006/customXml" ds:itemID="{1E91DBAA-73B1-46DE-A02B-B400BCCAEA24}">
+<ds:datastoreItem xmlns:ds="http://schemas.openxmlformats.org/officeDocument/2006/customXml" ds:itemID="{81018208-8004-4CED-BF44-ED368E32B811}">
   <ds:schemaRefs>
-    <ds:schemaRef ds:uri="http://purl.org/dc/terms/"/>
-    <ds:schemaRef ds:uri="http://schemas.microsoft.com/office/2006/documentManagement/types"/>
-    <ds:schemaRef ds:uri="http://purl.org/dc/elements/1.1/"/>
-    <ds:schemaRef ds:uri="http://schemas.microsoft.com/office/2006/metadata/properties"/>
-    <ds:schemaRef ds:uri="http://schemas.microsoft.com/office/infopath/2007/PartnerControls"/>
-    <ds:schemaRef ds:uri="http://purl.org/dc/dcmitype/"/>
-    <ds:schemaRef ds:uri="87bad0cd-9f5f-4471-94ca-f7c37ef15840"/>
-    <ds:schemaRef ds:uri="http://schemas.openxmlformats.org/package/2006/metadata/core-properties"/>
-    <ds:schemaRef ds:uri="8f159844-3118-4b08-9ac0-0a51e3431bb6"/>
-    <ds:schemaRef ds:uri="http://www.w3.org/XML/1998/namespace"/>
+    <ds:schemaRef ds:uri="http://schemas.microsoft.com/sharepoint/v3/contenttype/forms"/>
   </ds:schemaRefs>
 </ds:datastoreItem>
 </file>
@@ -45788,9 +44483,18 @@
 </file>
 
 <file path=customXml/itemProps3.xml><?xml version="1.0" encoding="utf-8"?>
-<ds:datastoreItem xmlns:ds="http://schemas.openxmlformats.org/officeDocument/2006/customXml" ds:itemID="{81018208-8004-4CED-BF44-ED368E32B811}">
+<ds:datastoreItem xmlns:ds="http://schemas.openxmlformats.org/officeDocument/2006/customXml" ds:itemID="{1E91DBAA-73B1-46DE-A02B-B400BCCAEA24}">
   <ds:schemaRefs>
-    <ds:schemaRef ds:uri="http://schemas.microsoft.com/sharepoint/v3/contenttype/forms"/>
+    <ds:schemaRef ds:uri="http://purl.org/dc/terms/"/>
+    <ds:schemaRef ds:uri="http://schemas.microsoft.com/office/2006/documentManagement/types"/>
+    <ds:schemaRef ds:uri="http://purl.org/dc/elements/1.1/"/>
+    <ds:schemaRef ds:uri="http://schemas.microsoft.com/office/2006/metadata/properties"/>
+    <ds:schemaRef ds:uri="http://schemas.microsoft.com/office/infopath/2007/PartnerControls"/>
+    <ds:schemaRef ds:uri="http://purl.org/dc/dcmitype/"/>
+    <ds:schemaRef ds:uri="87bad0cd-9f5f-4471-94ca-f7c37ef15840"/>
+    <ds:schemaRef ds:uri="http://schemas.openxmlformats.org/package/2006/metadata/core-properties"/>
+    <ds:schemaRef ds:uri="8f159844-3118-4b08-9ac0-0a51e3431bb6"/>
+    <ds:schemaRef ds:uri="http://www.w3.org/XML/1998/namespace"/>
   </ds:schemaRefs>
 </ds:datastoreItem>
 </file>
</xml_diff>